<commit_message>
Convert video url to clickable link
</commit_message>
<xml_diff>
--- a/External/Documentation/CooktastropheFinalPresUpdated.pptx
+++ b/External/Documentation/CooktastropheFinalPresUpdated.pptx
@@ -225,7 +225,7 @@
           <a:effectLst/>
           <a:extLst>
             <a:ext uri="{91240B29-F687-4f45-9708-019B960494DF}">
-              <a14:hiddenLine xmlns="" xmlns:a14="http://schemas.microsoft.com/office/drawing/2010/main" w="9525">
+              <a14:hiddenLine xmlns:a14="http://schemas.microsoft.com/office/drawing/2010/main" xmlns="" w="9525">
                 <a:solidFill>
                   <a:srgbClr val="000000"/>
                 </a:solidFill>
@@ -419,7 +419,7 @@
             <a:fld id="{A37D6D71-8B28-4ED6-B932-04B197003D23}" type="datetimeFigureOut">
               <a:rPr lang="en-US" smtClean="0"/>
               <a:pPr algn="r"/>
-              <a:t>4/26/2023</a:t>
+              <a:t>4/27/2023</a:t>
             </a:fld>
             <a:endParaRPr lang="en-US"/>
           </a:p>
@@ -580,7 +580,7 @@
           <a:ln/>
           <a:extLst>
             <a:ext uri="{91240B29-F687-4f45-9708-019B960494DF}">
-              <a14:hiddenLine xmlns="" xmlns:a14="http://schemas.microsoft.com/office/drawing/2010/main" w="9525">
+              <a14:hiddenLine xmlns:a14="http://schemas.microsoft.com/office/drawing/2010/main" xmlns="" w="9525">
                 <a:solidFill>
                   <a:srgbClr val="000000"/>
                 </a:solidFill>
@@ -710,7 +710,7 @@
             <a:fld id="{A37D6D71-8B28-4ED6-B932-04B197003D23}" type="datetimeFigureOut">
               <a:rPr lang="en-US" smtClean="0"/>
               <a:pPr algn="r"/>
-              <a:t>4/26/2023</a:t>
+              <a:t>4/27/2023</a:t>
             </a:fld>
             <a:endParaRPr lang="en-US"/>
           </a:p>
@@ -978,7 +978,7 @@
             <a:fld id="{A37D6D71-8B28-4ED6-B932-04B197003D23}" type="datetimeFigureOut">
               <a:rPr lang="en-US" smtClean="0"/>
               <a:pPr algn="r"/>
-              <a:t>4/26/2023</a:t>
+              <a:t>4/27/2023</a:t>
             </a:fld>
             <a:endParaRPr lang="en-US" spc="50"/>
           </a:p>
@@ -2148,7 +2148,7 @@
           <a:effectLst/>
           <a:extLst>
             <a:ext uri="{91240B29-F687-4f45-9708-019B960494DF}">
-              <a14:hiddenLine xmlns:a16="http://schemas.microsoft.com/office/drawing/2014/main" xmlns:p14="http://schemas.microsoft.com/office/powerpoint/2010/main" xmlns:a14="http://schemas.microsoft.com/office/drawing/2010/main" xmlns="" w="9525">
+              <a14:hiddenLine xmlns="" xmlns:a14="http://schemas.microsoft.com/office/drawing/2010/main" xmlns:p14="http://schemas.microsoft.com/office/powerpoint/2010/main" xmlns:a16="http://schemas.microsoft.com/office/drawing/2014/main" w="9525">
                 <a:solidFill>
                   <a:srgbClr val="000000"/>
                 </a:solidFill>
@@ -2603,7 +2603,7 @@
           <a:effectLst/>
           <a:extLst>
             <a:ext uri="{91240B29-F687-4f45-9708-019B960494DF}">
-              <a14:hiddenLine xmlns:a16="http://schemas.microsoft.com/office/drawing/2014/main" xmlns:p14="http://schemas.microsoft.com/office/powerpoint/2010/main" xmlns:a14="http://schemas.microsoft.com/office/drawing/2010/main" xmlns="" w="9525">
+              <a14:hiddenLine xmlns="" xmlns:a14="http://schemas.microsoft.com/office/drawing/2010/main" xmlns:p14="http://schemas.microsoft.com/office/powerpoint/2010/main" xmlns:a16="http://schemas.microsoft.com/office/drawing/2014/main" w="9525">
                 <a:solidFill>
                   <a:srgbClr val="000000"/>
                 </a:solidFill>
@@ -3631,10 +3631,12 @@
           <a:lstStyle/>
           <a:p>
             <a:r>
-              <a:rPr lang="en-US" dirty="0"/>
-              <a:t>https://drive.google.com/file/d/1BIrGVNEsN8nozrUCbU7HQbYSIlp6N1BC/view?usp=sharing</a:t>
-            </a:r>
-            <a:endParaRPr lang="en-US"/>
+              <a:rPr lang="en-US">
+                <a:hlinkClick r:id="rId2"/>
+              </a:rPr>
+              <a:t>Video Link</a:t>
+            </a:r>
+            <a:endParaRPr lang="en-US" dirty="0"/>
           </a:p>
         </p:txBody>
       </p:sp>

</xml_diff>